<commit_message>
Change font Lucida Console -> Consolas
</commit_message>
<xml_diff>
--- a/coverslide.pptx
+++ b/coverslide.pptx
@@ -104,6 +104,11 @@
       </a:defRPr>
     </a:lvl9pPr>
   </p:defaultTextStyle>
+  <p:extLst>
+    <p:ext uri="{EFAFB233-063F-42B5-8137-9DF3F51BA10A}">
+      <p15:sldGuideLst xmlns:p15="http://schemas.microsoft.com/office/powerpoint/2012/main"/>
+    </p:ext>
+  </p:extLst>
 </p:presentation>
 </file>
 
@@ -2995,7 +3000,7 @@
           <a:p>
             <a:r>
               <a:rPr lang="en-ZA" sz="4400" dirty="0" err="1">
-                <a:latin typeface="Lucida Console" panose="020B0609040504020204" pitchFamily="49" charset="0"/>
+                <a:latin typeface="Consolas" panose="020B0609020204030204" pitchFamily="49" charset="0"/>
               </a:rPr>
               <a:t>data_wrangling</a:t>
             </a:r>
@@ -3006,7 +3011,7 @@
                     <a:lumMod val="75000"/>
                   </a:schemeClr>
                 </a:solidFill>
-                <a:latin typeface="Lucida Console" panose="020B0609040504020204" pitchFamily="49" charset="0"/>
+                <a:latin typeface="Consolas" panose="020B0609020204030204" pitchFamily="49" charset="0"/>
               </a:rPr>
               <a:t>() &amp;&amp;</a:t>
             </a:r>
@@ -3019,7 +3024,7 @@
                     <a:lumMod val="75000"/>
                   </a:schemeClr>
                 </a:solidFill>
-                <a:latin typeface="Lucida Console" panose="020B0609040504020204" pitchFamily="49" charset="0"/>
+                <a:latin typeface="Consolas" panose="020B0609020204030204" pitchFamily="49" charset="0"/>
               </a:rPr>
               <a:t>(</a:t>
             </a:r>
@@ -3030,13 +3035,13 @@
                     <a:lumMod val="75000"/>
                   </a:schemeClr>
                 </a:solidFill>
-                <a:latin typeface="Lucida Console" panose="020B0609040504020204" pitchFamily="49" charset="0"/>
+                <a:latin typeface="Consolas" panose="020B0609020204030204" pitchFamily="49" charset="0"/>
               </a:rPr>
               <a:t>"manipulation"</a:t>
             </a:r>
             <a:r>
               <a:rPr lang="en-ZA" sz="4400" dirty="0">
-                <a:latin typeface="Lucida Console" panose="020B0609040504020204" pitchFamily="49" charset="0"/>
+                <a:latin typeface="Consolas" panose="020B0609020204030204" pitchFamily="49" charset="0"/>
               </a:rPr>
               <a:t> </a:t>
             </a:r>
@@ -3047,13 +3052,13 @@
                     <a:lumMod val="75000"/>
                   </a:schemeClr>
                 </a:solidFill>
-                <a:latin typeface="Lucida Console" panose="020B0609040504020204" pitchFamily="49" charset="0"/>
+                <a:latin typeface="Consolas" panose="020B0609020204030204" pitchFamily="49" charset="0"/>
               </a:rPr>
               <a:t>%in%</a:t>
             </a:r>
             <a:r>
               <a:rPr lang="en-ZA" sz="4400" dirty="0">
-                <a:latin typeface="Lucida Console" panose="020B0609040504020204" pitchFamily="49" charset="0"/>
+                <a:latin typeface="Consolas" panose="020B0609020204030204" pitchFamily="49" charset="0"/>
               </a:rPr>
               <a:t> R</a:t>
             </a:r>
@@ -3064,7 +3069,7 @@
                     <a:lumMod val="75000"/>
                   </a:schemeClr>
                 </a:solidFill>
-                <a:latin typeface="Lucida Console" panose="020B0609040504020204" pitchFamily="49" charset="0"/>
+                <a:latin typeface="Consolas" panose="020B0609020204030204" pitchFamily="49" charset="0"/>
               </a:rPr>
               <a:t>)</a:t>
             </a:r>
@@ -3086,7 +3091,7 @@
         <p:spPr>
           <a:xfrm>
             <a:off x="493470" y="4471364"/>
-            <a:ext cx="4507965" cy="2031325"/>
+            <a:ext cx="4110421" cy="2031325"/>
           </a:xfrm>
           <a:prstGeom prst="rect">
             <a:avLst/>
@@ -3100,7 +3105,7 @@
           <a:p>
             <a:r>
               <a:rPr lang="en-ZA" dirty="0" err="1">
-                <a:latin typeface="Lucida Console" panose="020B0609040504020204" pitchFamily="49" charset="0"/>
+                <a:latin typeface="Consolas" panose="020B0609020204030204" pitchFamily="49" charset="0"/>
               </a:rPr>
               <a:t>postgraduate_workshop</a:t>
             </a:r>
@@ -3111,7 +3116,7 @@
                     <a:lumMod val="75000"/>
                   </a:schemeClr>
                 </a:solidFill>
-                <a:latin typeface="Lucida Console" panose="020B0609040504020204" pitchFamily="49" charset="0"/>
+                <a:latin typeface="Consolas" panose="020B0609020204030204" pitchFamily="49" charset="0"/>
               </a:rPr>
               <a:t>(</a:t>
             </a:r>
@@ -3119,13 +3124,13 @@
           <a:p>
             <a:r>
               <a:rPr lang="en-ZA" dirty="0">
-                <a:latin typeface="Lucida Console" panose="020B0609040504020204" pitchFamily="49" charset="0"/>
+                <a:latin typeface="Consolas" panose="020B0609020204030204" pitchFamily="49" charset="0"/>
               </a:rPr>
               <a:t>  </a:t>
             </a:r>
             <a:r>
               <a:rPr lang="nl-NL" dirty="0">
-                <a:latin typeface="Lucida Console" panose="020B0609040504020204" pitchFamily="49" charset="0"/>
+                <a:latin typeface="Consolas" panose="020B0609020204030204" pitchFamily="49" charset="0"/>
               </a:rPr>
               <a:t>dept </a:t>
             </a:r>
@@ -3136,13 +3141,13 @@
                     <a:lumMod val="75000"/>
                   </a:schemeClr>
                 </a:solidFill>
-                <a:latin typeface="Lucida Console" panose="020B0609040504020204" pitchFamily="49" charset="0"/>
+                <a:latin typeface="Consolas" panose="020B0609020204030204" pitchFamily="49" charset="0"/>
               </a:rPr>
               <a:t>=</a:t>
             </a:r>
             <a:r>
               <a:rPr lang="nl-NL" dirty="0">
-                <a:latin typeface="Lucida Console" panose="020B0609040504020204" pitchFamily="49" charset="0"/>
+                <a:latin typeface="Consolas" panose="020B0609020204030204" pitchFamily="49" charset="0"/>
               </a:rPr>
               <a:t> </a:t>
             </a:r>
@@ -3153,7 +3158,7 @@
                     <a:lumMod val="75000"/>
                   </a:schemeClr>
                 </a:solidFill>
-                <a:latin typeface="Lucida Console" panose="020B0609040504020204" pitchFamily="49" charset="0"/>
+                <a:latin typeface="Consolas" panose="020B0609020204030204" pitchFamily="49" charset="0"/>
               </a:rPr>
               <a:t>"</a:t>
             </a:r>
@@ -3164,7 +3169,7 @@
                     <a:lumMod val="75000"/>
                   </a:schemeClr>
                 </a:solidFill>
-                <a:latin typeface="Lucida Console" panose="020B0609040504020204" pitchFamily="49" charset="0"/>
+                <a:latin typeface="Consolas" panose="020B0609020204030204" pitchFamily="49" charset="0"/>
               </a:rPr>
               <a:t>Biological Sciences</a:t>
             </a:r>
@@ -3175,13 +3180,13 @@
                     <a:lumMod val="75000"/>
                   </a:schemeClr>
                 </a:solidFill>
-                <a:latin typeface="Lucida Console" panose="020B0609040504020204" pitchFamily="49" charset="0"/>
+                <a:latin typeface="Consolas" panose="020B0609020204030204" pitchFamily="49" charset="0"/>
               </a:rPr>
               <a:t>"</a:t>
             </a:r>
             <a:r>
               <a:rPr lang="nl-NL" dirty="0">
-                <a:latin typeface="Lucida Console" panose="020B0609040504020204" pitchFamily="49" charset="0"/>
+                <a:latin typeface="Consolas" panose="020B0609020204030204" pitchFamily="49" charset="0"/>
               </a:rPr>
               <a:t>,</a:t>
             </a:r>
@@ -3189,7 +3194,7 @@
           <a:p>
             <a:r>
               <a:rPr lang="nl-NL" dirty="0">
-                <a:latin typeface="Lucida Console" panose="020B0609040504020204" pitchFamily="49" charset="0"/>
+                <a:latin typeface="Consolas" panose="020B0609020204030204" pitchFamily="49" charset="0"/>
               </a:rPr>
               <a:t>  presenter </a:t>
             </a:r>
@@ -3200,13 +3205,13 @@
                     <a:lumMod val="75000"/>
                   </a:schemeClr>
                 </a:solidFill>
-                <a:latin typeface="Lucida Console" panose="020B0609040504020204" pitchFamily="49" charset="0"/>
+                <a:latin typeface="Consolas" panose="020B0609020204030204" pitchFamily="49" charset="0"/>
               </a:rPr>
               <a:t>=</a:t>
             </a:r>
             <a:r>
               <a:rPr lang="nl-NL" dirty="0">
-                <a:latin typeface="Lucida Console" panose="020B0609040504020204" pitchFamily="49" charset="0"/>
+                <a:latin typeface="Consolas" panose="020B0609020204030204" pitchFamily="49" charset="0"/>
               </a:rPr>
               <a:t> c</a:t>
             </a:r>
@@ -3217,7 +3222,7 @@
                     <a:lumMod val="75000"/>
                   </a:schemeClr>
                 </a:solidFill>
-                <a:latin typeface="Lucida Console" panose="020B0609040504020204" pitchFamily="49" charset="0"/>
+                <a:latin typeface="Consolas" panose="020B0609020204030204" pitchFamily="49" charset="0"/>
               </a:rPr>
               <a:t>(</a:t>
             </a:r>
@@ -3230,7 +3235,7 @@
                     <a:lumMod val="75000"/>
                   </a:schemeClr>
                 </a:solidFill>
-                <a:latin typeface="Lucida Console" panose="020B0609040504020204" pitchFamily="49" charset="0"/>
+                <a:latin typeface="Consolas" panose="020B0609020204030204" pitchFamily="49" charset="0"/>
               </a:rPr>
               <a:t>    </a:t>
             </a:r>
@@ -3241,7 +3246,7 @@
                     <a:lumMod val="75000"/>
                   </a:schemeClr>
                 </a:solidFill>
-                <a:latin typeface="Lucida Console" panose="020B0609040504020204" pitchFamily="49" charset="0"/>
+                <a:latin typeface="Consolas" panose="020B0609020204030204" pitchFamily="49" charset="0"/>
               </a:rPr>
               <a:t>"</a:t>
             </a:r>
@@ -3252,7 +3257,7 @@
                     <a:lumMod val="75000"/>
                   </a:schemeClr>
                 </a:solidFill>
-                <a:latin typeface="Lucida Console" panose="020B0609040504020204" pitchFamily="49" charset="0"/>
+                <a:latin typeface="Consolas" panose="020B0609020204030204" pitchFamily="49" charset="0"/>
               </a:rPr>
               <a:t>Ruan van Mazijk</a:t>
             </a:r>
@@ -3263,13 +3268,13 @@
                     <a:lumMod val="75000"/>
                   </a:schemeClr>
                 </a:solidFill>
-                <a:latin typeface="Lucida Console" panose="020B0609040504020204" pitchFamily="49" charset="0"/>
+                <a:latin typeface="Consolas" panose="020B0609020204030204" pitchFamily="49" charset="0"/>
               </a:rPr>
               <a:t>"</a:t>
             </a:r>
             <a:r>
               <a:rPr lang="nl-NL" dirty="0">
-                <a:latin typeface="Lucida Console" panose="020B0609040504020204" pitchFamily="49" charset="0"/>
+                <a:latin typeface="Consolas" panose="020B0609020204030204" pitchFamily="49" charset="0"/>
               </a:rPr>
               <a:t>, </a:t>
             </a:r>
@@ -3282,7 +3287,7 @@
                     <a:lumMod val="75000"/>
                   </a:schemeClr>
                 </a:solidFill>
-                <a:latin typeface="Lucida Console" panose="020B0609040504020204" pitchFamily="49" charset="0"/>
+                <a:latin typeface="Consolas" panose="020B0609020204030204" pitchFamily="49" charset="0"/>
               </a:rPr>
               <a:t>    </a:t>
             </a:r>
@@ -3293,7 +3298,7 @@
                     <a:lumMod val="75000"/>
                   </a:schemeClr>
                 </a:solidFill>
-                <a:latin typeface="Lucida Console" panose="020B0609040504020204" pitchFamily="49" charset="0"/>
+                <a:latin typeface="Consolas" panose="020B0609020204030204" pitchFamily="49" charset="0"/>
               </a:rPr>
               <a:t>"</a:t>
             </a:r>
@@ -3304,7 +3309,7 @@
                     <a:lumMod val="75000"/>
                   </a:schemeClr>
                 </a:solidFill>
-                <a:latin typeface="Lucida Console" panose="020B0609040504020204" pitchFamily="49" charset="0"/>
+                <a:latin typeface="Consolas" panose="020B0609020204030204" pitchFamily="49" charset="0"/>
               </a:rPr>
               <a:t>MSc candidate</a:t>
             </a:r>
@@ -3315,7 +3320,7 @@
                     <a:lumMod val="75000"/>
                   </a:schemeClr>
                 </a:solidFill>
-                <a:latin typeface="Lucida Console" panose="020B0609040504020204" pitchFamily="49" charset="0"/>
+                <a:latin typeface="Consolas" panose="020B0609020204030204" pitchFamily="49" charset="0"/>
               </a:rPr>
               <a:t>"</a:t>
             </a:r>
@@ -3328,7 +3333,7 @@
                     <a:lumMod val="75000"/>
                   </a:schemeClr>
                 </a:solidFill>
-                <a:latin typeface="Lucida Console" panose="020B0609040504020204" pitchFamily="49" charset="0"/>
+                <a:latin typeface="Consolas" panose="020B0609020204030204" pitchFamily="49" charset="0"/>
               </a:rPr>
               <a:t>  )</a:t>
             </a:r>
@@ -3341,7 +3346,7 @@
                     <a:lumMod val="75000"/>
                   </a:schemeClr>
                 </a:solidFill>
-                <a:latin typeface="Lucida Console" panose="020B0609040504020204" pitchFamily="49" charset="0"/>
+                <a:latin typeface="Consolas" panose="020B0609020204030204" pitchFamily="49" charset="0"/>
               </a:rPr>
               <a:t>)</a:t>
             </a:r>
@@ -3351,7 +3356,7 @@
                   <a:lumMod val="75000"/>
                 </a:schemeClr>
               </a:solidFill>
-              <a:latin typeface="Lucida Console" panose="020B0609040504020204" pitchFamily="49" charset="0"/>
+              <a:latin typeface="Consolas" panose="020B0609020204030204" pitchFamily="49" charset="0"/>
             </a:endParaRPr>
           </a:p>
         </p:txBody>
@@ -3407,7 +3412,7 @@
         <p:spPr>
           <a:xfrm>
             <a:off x="7038677" y="2905780"/>
-            <a:ext cx="1043876" cy="523220"/>
+            <a:ext cx="979755" cy="523220"/>
           </a:xfrm>
           <a:prstGeom prst="rect">
             <a:avLst/>
@@ -3426,7 +3431,7 @@
                     <a:lumMod val="75000"/>
                   </a:schemeClr>
                 </a:solidFill>
-                <a:latin typeface="Lucida Console" panose="020B0609040504020204" pitchFamily="49" charset="0"/>
+                <a:latin typeface="Consolas" panose="020B0609020204030204" pitchFamily="49" charset="0"/>
               </a:rPr>
               <a:t>&gt; logo()</a:t>
             </a:r>
@@ -3439,7 +3444,7 @@
                     <a:lumMod val="75000"/>
                   </a:schemeClr>
                 </a:solidFill>
-                <a:latin typeface="Lucida Console" panose="020B0609040504020204" pitchFamily="49" charset="0"/>
+                <a:latin typeface="Consolas" panose="020B0609020204030204" pitchFamily="49" charset="0"/>
               </a:rPr>
               <a:t>## [1]</a:t>
             </a:r>
@@ -3461,7 +3466,7 @@
         <p:spPr>
           <a:xfrm>
             <a:off x="7038677" y="4571337"/>
-            <a:ext cx="1043876" cy="523220"/>
+            <a:ext cx="979755" cy="523220"/>
           </a:xfrm>
           <a:prstGeom prst="rect">
             <a:avLst/>
@@ -3480,7 +3485,7 @@
                     <a:lumMod val="75000"/>
                   </a:schemeClr>
                 </a:solidFill>
-                <a:latin typeface="Lucida Console" panose="020B0609040504020204" pitchFamily="49" charset="0"/>
+                <a:latin typeface="Consolas" panose="020B0609020204030204" pitchFamily="49" charset="0"/>
               </a:rPr>
               <a:t>&gt; face()</a:t>
             </a:r>
@@ -3493,7 +3498,7 @@
                     <a:lumMod val="75000"/>
                   </a:schemeClr>
                 </a:solidFill>
-                <a:latin typeface="Lucida Console" panose="020B0609040504020204" pitchFamily="49" charset="0"/>
+                <a:latin typeface="Consolas" panose="020B0609020204030204" pitchFamily="49" charset="0"/>
               </a:rPr>
               <a:t>## [1]</a:t>
             </a:r>
@@ -3534,17 +3539,16 @@
                     <a:lumMod val="75000"/>
                   </a:schemeClr>
                 </a:solidFill>
-                <a:latin typeface="Lucida Console" panose="020B0609040504020204" pitchFamily="49" charset="0"/>
+                <a:latin typeface="Consolas" panose="020B0609020204030204" pitchFamily="49" charset="0"/>
               </a:rPr>
               <a:t>%&gt;%</a:t>
             </a:r>
             <a:r>
               <a:rPr lang="en-ZA" sz="4400" dirty="0">
-                <a:latin typeface="Lucida Console" panose="020B0609040504020204" pitchFamily="49" charset="0"/>
+                <a:latin typeface="Consolas" panose="020B0609020204030204" pitchFamily="49" charset="0"/>
               </a:rPr>
               <a:t> </a:t>
             </a:r>
-            <a:endParaRPr lang="en-ZA" sz="4400" dirty="0"/>
           </a:p>
         </p:txBody>
       </p:sp>

</xml_diff>